<commit_message>
Removed UO specific stuff
</commit_message>
<xml_diff>
--- a/docs/Slides/2-Intro-1-Debugging.pptx
+++ b/docs/Slides/2-Intro-1-Debugging.pptx
@@ -229,14 +229,14 @@
           <a:effectLst/>
           <a:extLst>
             <a:ext uri="{909E8E84-426E-40dd-AFC4-6F175D3DCCD1}">
-              <a14:hiddenFill xmlns:a14="http://schemas.microsoft.com/office/drawing/2010/main" xmlns="">
+              <a14:hiddenFill xmlns="" xmlns:a14="http://schemas.microsoft.com/office/drawing/2010/main">
                 <a:solidFill>
                   <a:schemeClr val="accent1"/>
                 </a:solidFill>
               </a14:hiddenFill>
             </a:ext>
             <a:ext uri="{91240B29-F687-4f45-9708-019B960494DF}">
-              <a14:hiddenLine xmlns:a14="http://schemas.microsoft.com/office/drawing/2010/main" xmlns="" w="9525">
+              <a14:hiddenLine xmlns="" xmlns:a14="http://schemas.microsoft.com/office/drawing/2010/main" w="9525">
                 <a:solidFill>
                   <a:schemeClr val="tx1"/>
                 </a:solidFill>
@@ -246,7 +246,7 @@
               </a14:hiddenLine>
             </a:ext>
             <a:ext uri="{AF507438-7753-43e0-B8FC-AC1667EBCBE1}">
-              <a14:hiddenEffects xmlns:a14="http://schemas.microsoft.com/office/drawing/2010/main" xmlns="">
+              <a14:hiddenEffects xmlns="" xmlns:a14="http://schemas.microsoft.com/office/drawing/2010/main">
                 <a:effectLst>
                   <a:outerShdw dist="35921" dir="2700000" algn="ctr" rotWithShape="0">
                     <a:schemeClr val="bg2"/>
@@ -300,14 +300,14 @@
           <a:effectLst/>
           <a:extLst>
             <a:ext uri="{909E8E84-426E-40dd-AFC4-6F175D3DCCD1}">
-              <a14:hiddenFill xmlns:a14="http://schemas.microsoft.com/office/drawing/2010/main" xmlns="">
+              <a14:hiddenFill xmlns="" xmlns:a14="http://schemas.microsoft.com/office/drawing/2010/main">
                 <a:solidFill>
                   <a:schemeClr val="accent1"/>
                 </a:solidFill>
               </a14:hiddenFill>
             </a:ext>
             <a:ext uri="{91240B29-F687-4f45-9708-019B960494DF}">
-              <a14:hiddenLine xmlns:a14="http://schemas.microsoft.com/office/drawing/2010/main" xmlns="" w="9525">
+              <a14:hiddenLine xmlns="" xmlns:a14="http://schemas.microsoft.com/office/drawing/2010/main" w="9525">
                 <a:solidFill>
                   <a:schemeClr val="tx1"/>
                 </a:solidFill>
@@ -317,7 +317,7 @@
               </a14:hiddenLine>
             </a:ext>
             <a:ext uri="{AF507438-7753-43e0-B8FC-AC1667EBCBE1}">
-              <a14:hiddenEffects xmlns:a14="http://schemas.microsoft.com/office/drawing/2010/main" xmlns="">
+              <a14:hiddenEffects xmlns="" xmlns:a14="http://schemas.microsoft.com/office/drawing/2010/main">
                 <a:effectLst>
                   <a:outerShdw dist="35921" dir="2700000" algn="ctr" rotWithShape="0">
                     <a:schemeClr val="bg2"/>
@@ -347,7 +347,7 @@
               <a:pPr>
                 <a:defRPr/>
               </a:pPr>
-              <a:t>6/28/18</a:t>
+              <a:t>10/7/19</a:t>
             </a:fld>
             <a:endParaRPr lang="en-US"/>
           </a:p>
@@ -378,14 +378,14 @@
           <a:effectLst/>
           <a:extLst>
             <a:ext uri="{909E8E84-426E-40dd-AFC4-6F175D3DCCD1}">
-              <a14:hiddenFill xmlns:a14="http://schemas.microsoft.com/office/drawing/2010/main" xmlns="">
+              <a14:hiddenFill xmlns="" xmlns:a14="http://schemas.microsoft.com/office/drawing/2010/main">
                 <a:solidFill>
                   <a:schemeClr val="accent1"/>
                 </a:solidFill>
               </a14:hiddenFill>
             </a:ext>
             <a:ext uri="{91240B29-F687-4f45-9708-019B960494DF}">
-              <a14:hiddenLine xmlns:a14="http://schemas.microsoft.com/office/drawing/2010/main" xmlns="" w="9525">
+              <a14:hiddenLine xmlns="" xmlns:a14="http://schemas.microsoft.com/office/drawing/2010/main" w="9525">
                 <a:solidFill>
                   <a:schemeClr val="tx1"/>
                 </a:solidFill>
@@ -395,7 +395,7 @@
               </a14:hiddenLine>
             </a:ext>
             <a:ext uri="{AF507438-7753-43e0-B8FC-AC1667EBCBE1}">
-              <a14:hiddenEffects xmlns:a14="http://schemas.microsoft.com/office/drawing/2010/main" xmlns="">
+              <a14:hiddenEffects xmlns="" xmlns:a14="http://schemas.microsoft.com/office/drawing/2010/main">
                 <a:effectLst>
                   <a:outerShdw dist="35921" dir="2700000" algn="ctr" rotWithShape="0">
                     <a:schemeClr val="bg2"/>
@@ -449,14 +449,14 @@
           <a:effectLst/>
           <a:extLst>
             <a:ext uri="{909E8E84-426E-40dd-AFC4-6F175D3DCCD1}">
-              <a14:hiddenFill xmlns:a14="http://schemas.microsoft.com/office/drawing/2010/main" xmlns="">
+              <a14:hiddenFill xmlns="" xmlns:a14="http://schemas.microsoft.com/office/drawing/2010/main">
                 <a:solidFill>
                   <a:schemeClr val="accent1"/>
                 </a:solidFill>
               </a14:hiddenFill>
             </a:ext>
             <a:ext uri="{91240B29-F687-4f45-9708-019B960494DF}">
-              <a14:hiddenLine xmlns:a14="http://schemas.microsoft.com/office/drawing/2010/main" xmlns="" w="9525">
+              <a14:hiddenLine xmlns="" xmlns:a14="http://schemas.microsoft.com/office/drawing/2010/main" w="9525">
                 <a:solidFill>
                   <a:schemeClr val="tx1"/>
                 </a:solidFill>
@@ -466,7 +466,7 @@
               </a14:hiddenLine>
             </a:ext>
             <a:ext uri="{AF507438-7753-43e0-B8FC-AC1667EBCBE1}">
-              <a14:hiddenEffects xmlns:a14="http://schemas.microsoft.com/office/drawing/2010/main" xmlns="">
+              <a14:hiddenEffects xmlns="" xmlns:a14="http://schemas.microsoft.com/office/drawing/2010/main">
                 <a:effectLst>
                   <a:outerShdw dist="35921" dir="2700000" algn="ctr" rotWithShape="0">
                     <a:schemeClr val="bg2"/>
@@ -663,7 +663,7 @@
           </a:ln>
           <a:extLst>
             <a:ext uri="{909E8E84-426E-40dd-AFC4-6F175D3DCCD1}">
-              <a14:hiddenFill xmlns:a14="http://schemas.microsoft.com/office/drawing/2010/main" xmlns="">
+              <a14:hiddenFill xmlns="" xmlns:a14="http://schemas.microsoft.com/office/drawing/2010/main">
                 <a:solidFill>
                   <a:srgbClr val="FFFFFF"/>
                 </a:solidFill>
@@ -1272,14 +1272,14 @@
           </a:ln>
           <a:extLst>
             <a:ext uri="{909E8E84-426E-40dd-AFC4-6F175D3DCCD1}">
-              <a14:hiddenFill xmlns:a14="http://schemas.microsoft.com/office/drawing/2010/main" xmlns="">
+              <a14:hiddenFill xmlns="" xmlns:a14="http://schemas.microsoft.com/office/drawing/2010/main">
                 <a:solidFill>
                   <a:srgbClr val="FFFFFF"/>
                 </a:solidFill>
               </a14:hiddenFill>
             </a:ext>
             <a:ext uri="{91240B29-F687-4f45-9708-019B960494DF}">
-              <a14:hiddenLine xmlns:a14="http://schemas.microsoft.com/office/drawing/2010/main" xmlns="" w="9525">
+              <a14:hiddenLine xmlns="" xmlns:a14="http://schemas.microsoft.com/office/drawing/2010/main" w="9525">
                 <a:solidFill>
                   <a:srgbClr val="000000"/>
                 </a:solidFill>
@@ -1619,7 +1619,7 @@
           <a:p>
             <a:fld id="{12110144-19AD-4D4E-902D-E18AF93089D3}" type="datetimeFigureOut">
               <a:rPr lang="en-US" smtClean="0"/>
-              <a:t>6/28/18</a:t>
+              <a:t>10/7/19</a:t>
             </a:fld>
             <a:endParaRPr lang="en-US"/>
           </a:p>
@@ -1904,7 +1904,7 @@
           <a:p>
             <a:fld id="{12110144-19AD-4D4E-902D-E18AF93089D3}" type="datetimeFigureOut">
               <a:rPr lang="en-US" smtClean="0"/>
-              <a:t>6/28/18</a:t>
+              <a:t>10/7/19</a:t>
             </a:fld>
             <a:endParaRPr lang="en-US"/>
           </a:p>
@@ -2014,14 +2014,14 @@
           </a:ln>
           <a:extLst>
             <a:ext uri="{909E8E84-426E-40dd-AFC4-6F175D3DCCD1}">
-              <a14:hiddenFill xmlns:a14="http://schemas.microsoft.com/office/drawing/2010/main" xmlns="">
+              <a14:hiddenFill xmlns="" xmlns:a14="http://schemas.microsoft.com/office/drawing/2010/main">
                 <a:solidFill>
                   <a:srgbClr val="FFFFFF"/>
                 </a:solidFill>
               </a14:hiddenFill>
             </a:ext>
             <a:ext uri="{91240B29-F687-4f45-9708-019B960494DF}">
-              <a14:hiddenLine xmlns:a14="http://schemas.microsoft.com/office/drawing/2010/main" xmlns="" w="9525">
+              <a14:hiddenLine xmlns="" xmlns:a14="http://schemas.microsoft.com/office/drawing/2010/main" w="9525">
                 <a:solidFill>
                   <a:srgbClr val="000000"/>
                 </a:solidFill>
@@ -2072,14 +2072,14 @@
           </a:ln>
           <a:extLst>
             <a:ext uri="{909E8E84-426E-40dd-AFC4-6F175D3DCCD1}">
-              <a14:hiddenFill xmlns:a14="http://schemas.microsoft.com/office/drawing/2010/main" xmlns="">
+              <a14:hiddenFill xmlns="" xmlns:a14="http://schemas.microsoft.com/office/drawing/2010/main">
                 <a:solidFill>
                   <a:srgbClr val="FFFFFF"/>
                 </a:solidFill>
               </a14:hiddenFill>
             </a:ext>
             <a:ext uri="{91240B29-F687-4f45-9708-019B960494DF}">
-              <a14:hiddenLine xmlns:a14="http://schemas.microsoft.com/office/drawing/2010/main" xmlns="" w="9525">
+              <a14:hiddenLine xmlns="" xmlns:a14="http://schemas.microsoft.com/office/drawing/2010/main" w="9525">
                 <a:solidFill>
                   <a:srgbClr val="000000"/>
                 </a:solidFill>
@@ -2706,39 +2706,6 @@
       </p:grpSpPr>
       <p:sp>
         <p:nvSpPr>
-          <p:cNvPr id="3" name="Subtitle 2"/>
-          <p:cNvSpPr>
-            <a:spLocks noGrp="1"/>
-          </p:cNvSpPr>
-          <p:nvPr>
-            <p:ph type="subTitle" idx="1"/>
-          </p:nvPr>
-        </p:nvSpPr>
-        <p:spPr>
-          <a:xfrm>
-            <a:off x="6096000" y="5181600"/>
-            <a:ext cx="2391112" cy="957740"/>
-          </a:xfrm>
-        </p:spPr>
-        <p:txBody>
-          <a:bodyPr>
-            <a:noAutofit/>
-          </a:bodyPr>
-          <a:lstStyle/>
-          <a:p>
-            <a:r>
-              <a:rPr lang="en-US" sz="4400" b="1" dirty="0">
-                <a:solidFill>
-                  <a:schemeClr val="tx1"/>
-                </a:solidFill>
-              </a:rPr>
-              <a:t>CIS 399</a:t>
-            </a:r>
-          </a:p>
-        </p:txBody>
-      </p:sp>
-      <p:sp>
-        <p:nvSpPr>
           <p:cNvPr id="4" name="TextBox 3"/>
           <p:cNvSpPr txBox="1"/>
           <p:nvPr/>
@@ -3171,7 +3138,7 @@
           <a:graphicData uri="http://schemas.openxmlformats.org/presentationml/2006/ole">
             <mc:AlternateContent xmlns:mc="http://schemas.openxmlformats.org/markup-compatibility/2006">
               <mc:Choice xmlns:v="urn:schemas-microsoft-com:vml" Requires="v">
-                <p:oleObj spid="_x0000_s38917" name="Document" r:id="rId3" imgW="7377498" imgH="1980363" progId="Word.Document.12">
+                <p:oleObj spid="_x0000_s38919" name="Document" r:id="rId3" imgW="7377498" imgH="1980363" progId="Word.Document.12">
                   <p:embed/>
                 </p:oleObj>
               </mc:Choice>
@@ -3228,14 +3195,14 @@
           </a:ln>
           <a:extLst>
             <a:ext uri="{909E8E84-426E-40dd-AFC4-6F175D3DCCD1}">
-              <a14:hiddenFill xmlns:a14="http://schemas.microsoft.com/office/drawing/2010/main" xmlns="">
+              <a14:hiddenFill xmlns="" xmlns:a14="http://schemas.microsoft.com/office/drawing/2010/main">
                 <a:solidFill>
                   <a:srgbClr val="FFFFFF"/>
                 </a:solidFill>
               </a14:hiddenFill>
             </a:ext>
             <a:ext uri="{91240B29-F687-4f45-9708-019B960494DF}">
-              <a14:hiddenLine xmlns:a14="http://schemas.microsoft.com/office/drawing/2010/main" xmlns="" w="9525">
+              <a14:hiddenLine xmlns="" xmlns:a14="http://schemas.microsoft.com/office/drawing/2010/main" w="9525">
                 <a:solidFill>
                   <a:srgbClr val="000000"/>
                 </a:solidFill>
@@ -3907,7 +3874,7 @@
           <a:graphicData uri="http://schemas.openxmlformats.org/presentationml/2006/ole">
             <mc:AlternateContent xmlns:mc="http://schemas.openxmlformats.org/markup-compatibility/2006">
               <mc:Choice xmlns:v="urn:schemas-microsoft-com:vml" Requires="v">
-                <p:oleObj spid="_x0000_s40965" name="Document" r:id="rId3" imgW="7301323" imgH="1545043" progId="Word.Document.12">
+                <p:oleObj spid="_x0000_s40967" name="Document" r:id="rId3" imgW="7301323" imgH="1545043" progId="Word.Document.12">
                   <p:embed/>
                 </p:oleObj>
               </mc:Choice>
@@ -4121,7 +4088,7 @@
           <a:graphicData uri="http://schemas.openxmlformats.org/presentationml/2006/ole">
             <mc:AlternateContent xmlns:mc="http://schemas.openxmlformats.org/markup-compatibility/2006">
               <mc:Choice xmlns:v="urn:schemas-microsoft-com:vml" Requires="v">
-                <p:oleObj spid="_x0000_s41989" name="Document" r:id="rId3" imgW="7301323" imgH="2835879" progId="Word.Document.12">
+                <p:oleObj spid="_x0000_s41991" name="Document" r:id="rId3" imgW="7301323" imgH="2835879" progId="Word.Document.12">
                   <p:embed/>
                 </p:oleObj>
               </mc:Choice>
@@ -4535,7 +4502,7 @@
           <a:graphicData uri="http://schemas.openxmlformats.org/presentationml/2006/ole">
             <mc:AlternateContent xmlns:mc="http://schemas.openxmlformats.org/markup-compatibility/2006">
               <mc:Choice xmlns:v="urn:schemas-microsoft-com:vml" Requires="v">
-                <p:oleObj spid="_x0000_s43013" name="Document" r:id="rId3" imgW="7301323" imgH="2037253" progId="Word.Document.12">
+                <p:oleObj spid="_x0000_s43015" name="Document" r:id="rId3" imgW="7301323" imgH="2037253" progId="Word.Document.12">
                   <p:embed/>
                 </p:oleObj>
               </mc:Choice>
@@ -4949,7 +4916,7 @@
           <a:graphicData uri="http://schemas.openxmlformats.org/presentationml/2006/ole">
             <mc:AlternateContent xmlns:mc="http://schemas.openxmlformats.org/markup-compatibility/2006">
               <mc:Choice xmlns:v="urn:schemas-microsoft-com:vml" Requires="v">
-                <p:oleObj spid="_x0000_s44037" name="Document" r:id="rId3" imgW="7301323" imgH="4854049" progId="Word.Document.12">
+                <p:oleObj spid="_x0000_s44039" name="Document" r:id="rId3" imgW="7301323" imgH="4854049" progId="Word.Document.12">
                   <p:embed/>
                 </p:oleObj>
               </mc:Choice>
@@ -4998,7 +4965,7 @@
 </file>
 
 <file path=ppt/slides/slide2.xml><?xml version="1.0" encoding="utf-8"?>
-<p:sld xmlns:a="http://schemas.openxmlformats.org/drawingml/2006/main" xmlns:r="http://schemas.openxmlformats.org/officeDocument/2006/relationships" xmlns:p="http://schemas.openxmlformats.org/presentationml/2006/main">
+<p:sld xmlns:a="http://schemas.openxmlformats.org/drawingml/2006/main" xmlns:r="http://schemas.openxmlformats.org/officeDocument/2006/relationships" xmlns:p="http://schemas.openxmlformats.org/presentationml/2006/main" show="0">
   <p:cSld>
     <p:bg>
       <p:bgPr>
@@ -5085,7 +5052,7 @@
         </p:nvGraphicFramePr>
         <p:xfrm>
           <a:off x="457200" y="1447800"/>
-          <a:ext cx="4038600" cy="4299243"/>
+          <a:ext cx="4038600" cy="4299244"/>
         </p:xfrm>
         <a:graphic>
           <a:graphicData uri="http://schemas.openxmlformats.org/drawingml/2006/table">
@@ -6025,7 +5992,7 @@
           <a:graphicData uri="http://schemas.openxmlformats.org/presentationml/2006/ole">
             <mc:AlternateContent xmlns:mc="http://schemas.openxmlformats.org/markup-compatibility/2006">
               <mc:Choice xmlns:v="urn:schemas-microsoft-com:vml" Requires="v">
-                <p:oleObj spid="_x0000_s1030" name="Document" r:id="rId3" imgW="7301323" imgH="1065435" progId="Word.Document.12">
+                <p:oleObj spid="_x0000_s1032" name="Document" r:id="rId3" imgW="7301323" imgH="1065435" progId="Word.Document.12">
                   <p:embed/>
                 </p:oleObj>
               </mc:Choice>
@@ -6082,14 +6049,14 @@
           </a:ln>
           <a:extLst>
             <a:ext uri="{909E8E84-426E-40dd-AFC4-6F175D3DCCD1}">
-              <a14:hiddenFill xmlns:a14="http://schemas.microsoft.com/office/drawing/2010/main" xmlns="">
+              <a14:hiddenFill xmlns="" xmlns:a14="http://schemas.microsoft.com/office/drawing/2010/main">
                 <a:solidFill>
                   <a:srgbClr val="FFFFFF"/>
                 </a:solidFill>
               </a14:hiddenFill>
             </a:ext>
             <a:ext uri="{91240B29-F687-4f45-9708-019B960494DF}">
-              <a14:hiddenLine xmlns:a14="http://schemas.microsoft.com/office/drawing/2010/main" xmlns="" w="9525">
+              <a14:hiddenLine xmlns="" xmlns:a14="http://schemas.microsoft.com/office/drawing/2010/main" w="9525">
                 <a:solidFill>
                   <a:srgbClr val="000000"/>
                 </a:solidFill>
@@ -6432,7 +6399,7 @@
           <a:graphicData uri="http://schemas.openxmlformats.org/presentationml/2006/ole">
             <mc:AlternateContent xmlns:mc="http://schemas.openxmlformats.org/markup-compatibility/2006">
               <mc:Choice xmlns:v="urn:schemas-microsoft-com:vml" Requires="v">
-                <p:oleObj spid="_x0000_s36869" name="Document" r:id="rId3" imgW="7301323" imgH="4191528" progId="Word.Document.12">
+                <p:oleObj spid="_x0000_s36871" name="Document" r:id="rId3" imgW="7301323" imgH="4191528" progId="Word.Document.12">
                   <p:embed/>
                 </p:oleObj>
               </mc:Choice>
@@ -6849,7 +6816,7 @@
           <a:graphicData uri="http://schemas.openxmlformats.org/presentationml/2006/ole">
             <mc:AlternateContent xmlns:mc="http://schemas.openxmlformats.org/markup-compatibility/2006">
               <mc:Choice xmlns:v="urn:schemas-microsoft-com:vml" Requires="v">
-                <p:oleObj spid="_x0000_s37893" name="Document" r:id="rId3" imgW="7301323" imgH="3686715" progId="Word.Document.12">
+                <p:oleObj spid="_x0000_s37895" name="Document" r:id="rId3" imgW="7301323" imgH="3686715" progId="Word.Document.12">
                   <p:embed/>
                 </p:oleObj>
               </mc:Choice>
@@ -7187,14 +7154,14 @@
           </a:ln>
           <a:extLst>
             <a:ext uri="{909E8E84-426E-40dd-AFC4-6F175D3DCCD1}">
-              <a14:hiddenFill xmlns:a14="http://schemas.microsoft.com/office/drawing/2010/main" xmlns="">
+              <a14:hiddenFill xmlns="" xmlns:a14="http://schemas.microsoft.com/office/drawing/2010/main">
                 <a:solidFill>
                   <a:srgbClr val="FFFFFF"/>
                 </a:solidFill>
               </a14:hiddenFill>
             </a:ext>
             <a:ext uri="{91240B29-F687-4f45-9708-019B960494DF}">
-              <a14:hiddenLine xmlns:a14="http://schemas.microsoft.com/office/drawing/2010/main" xmlns="" w="9525">
+              <a14:hiddenLine xmlns="" xmlns:a14="http://schemas.microsoft.com/office/drawing/2010/main" w="9525">
                 <a:solidFill>
                   <a:srgbClr val="000000"/>
                 </a:solidFill>

</xml_diff>